<commit_message>
PPT for the EDA presentation
</commit_message>
<xml_diff>
--- a/Analyzing Global Access to Public Transport.pptx
+++ b/Analyzing Global Access to Public Transport.pptx
@@ -5931,7 +5931,7 @@
                 <a:latin typeface="Arial" panose="020B0604020202020204" pitchFamily="34" charset="0"/>
                 <a:cs typeface="Arial" panose="020B0604020202020204" pitchFamily="34" charset="0"/>
               </a:rPr>
-              <a:t>In today’s world, where cities are growing faster than ever, having good public transportation is key. It not only helps in making our cities more sustainable but also plays a vital role in reducing traffic and improving quality of life.</a:t>
+              <a:t>In today’s world, where cities are growing faster than ever, having good public transportation is key. It not only helps in making our cities more sustainable but also plays a vital role in reducing traffic and improving quality of life</a:t>
             </a:r>
           </a:p>
           <a:p>
@@ -6023,7 +6023,7 @@
                 <a:latin typeface="Arial" panose="020B0604020202020204" pitchFamily="34" charset="0"/>
                 <a:cs typeface="Arial" panose="020B0604020202020204" pitchFamily="34" charset="0"/>
               </a:rPr>
-              <a:t>With this analysis, we dive deep into these questions, aiming to shed light on the global patterns of urban access to public transport. We want to understand the variations, explore the extremes, and ultimately, paint a clear picture of where we stand today in terms of accessible urban mobility.</a:t>
+              <a:t>With this analysis, we dive deep into these questions, aiming to shed light on the global patterns of urban access to public transport. We want to understand the variations, explore the extremes, and ultimately, paint a clear picture of where we stand today in terms of accessible urban mobility</a:t>
             </a:r>
             <a:endParaRPr lang="en-US" dirty="0">
               <a:solidFill>
@@ -6546,7 +6546,7 @@
                 <a:latin typeface="Arial" panose="020B0604020202020204" pitchFamily="34" charset="0"/>
                 <a:cs typeface="Arial" panose="020B0604020202020204" pitchFamily="34" charset="0"/>
               </a:rPr>
-              <a:t>The Accessible Population (Access_POP) metric quantifies the number of people within each urban center who have access to public transport. </a:t>
+              <a:t>The Accessible Population (Access_POP) metric quantifies the number of people within each urban center who have access to public transport </a:t>
             </a:r>
             <a:r>
               <a:rPr lang="en-IN" sz="1200" dirty="0">
@@ -6571,7 +6571,7 @@
                 <a:latin typeface="Arial" panose="020B0604020202020204" pitchFamily="34" charset="0"/>
                 <a:cs typeface="Arial" panose="020B0604020202020204" pitchFamily="34" charset="0"/>
               </a:rPr>
-              <a:t>onvenient access to public transport is defined as being within a 0.5-kilometer walking distance of a low-capacity public transport point or within a 1-kilometer walking distance of a high-capacity public transport point.</a:t>
+              <a:t>onvenient access to public transport is defined as being within a 0.5-kilometer walking distance of a low-capacity public transport point or within a 1-kilometer walking distance of a high-capacity public transport point</a:t>
             </a:r>
           </a:p>
           <a:p>
@@ -6609,7 +6609,7 @@
                 <a:latin typeface="Arial" panose="020B0604020202020204" pitchFamily="34" charset="0"/>
                 <a:cs typeface="Arial" panose="020B0604020202020204" pitchFamily="34" charset="0"/>
               </a:rPr>
-              <a:t>highlights the proportion of the total population that can conveniently access public transport, serving as a direct indicator of urban transport accessibility.</a:t>
+              <a:t>highlights the proportion of the total population that can conveniently access public transport, serving as a direct indicator of urban transport accessibility</a:t>
             </a:r>
           </a:p>
         </p:txBody>
@@ -7471,7 +7471,7 @@
                 <a:latin typeface="Arial" panose="020B0604020202020204" pitchFamily="34" charset="0"/>
                 <a:cs typeface="Arial" panose="020B0604020202020204" pitchFamily="34" charset="0"/>
               </a:rPr>
-              <a:t>Countries like China and India, despite their massive total populations, have a noticeable gap between total populations indicating areas of improvement in urban transport accessibility.</a:t>
+              <a:t>Countries like China and India, despite their massive total populations, have a noticeable gap between total populations indicating areas of improvement in urban transport accessibility</a:t>
             </a:r>
           </a:p>
           <a:p>
@@ -7495,7 +7495,7 @@
                 <a:latin typeface="Arial" panose="020B0604020202020204" pitchFamily="34" charset="0"/>
                 <a:cs typeface="Arial" panose="020B0604020202020204" pitchFamily="34" charset="0"/>
               </a:rPr>
-              <a:t>On the other hand, countries with smaller populations such as Japan, Russia, United Kingdom and South Korea showcase a higher access to public transport, reflecting their well-developed public transport networks.</a:t>
+              <a:t>On the other hand, countries with smaller populations such as Japan, Russia, United Kingdom and South Korea showcase a higher access to public transport, reflecting their well-developed public transport networks</a:t>
             </a:r>
           </a:p>
           <a:p>
@@ -7520,7 +7520,7 @@
                 <a:latin typeface="Arial" panose="020B0604020202020204" pitchFamily="34" charset="0"/>
                 <a:cs typeface="Arial" panose="020B0604020202020204" pitchFamily="34" charset="0"/>
               </a:rPr>
-              <a:t>Despite the United States economic prowess and advanced infrastructure, there's a noticeable disparity in public transport accessibility across its urban centers. This may be because of the country's vast geographical expanse and the predominant car culture, particularly in suburban and rural areas.</a:t>
+              <a:t>Despite the United States economic prowess and advanced infrastructure, there's a noticeable disparity in public transport accessibility across its urban centers. This may be because of the country's vast geographical expanse and the predominant car culture, particularly in suburban and rural areas</a:t>
             </a:r>
             <a:endParaRPr lang="en-US" sz="1400" i="1" dirty="0">
               <a:solidFill>
@@ -8337,7 +8337,7 @@
                   <a:latin typeface="Arial" panose="020B0604020202020204" pitchFamily="34" charset="0"/>
                   <a:cs typeface="Arial" panose="020B0604020202020204" pitchFamily="34" charset="0"/>
                 </a:rPr>
-                <a:t>Urban access to public transport is widespread, but it is noticeably higher in the eastern regions of the country compared to the western parts. This is reflective of China's economic landscape, where the eastern regions are more developed and urbanized.</a:t>
+                <a:t>Urban access to public transport is widespread, but it is noticeably higher in the eastern regions of the country compared to the western parts. This is reflective of China's economic landscape, where the eastern regions are more developed and urbanized</a:t>
               </a:r>
               <a:endParaRPr lang="en-IN" sz="1600" dirty="0">
                 <a:solidFill>
@@ -8667,7 +8667,7 @@
                 <a:latin typeface="Arial" panose="020B0604020202020204" pitchFamily="34" charset="0"/>
                 <a:cs typeface="Arial" panose="020B0604020202020204" pitchFamily="34" charset="0"/>
               </a:rPr>
-              <a:t>Countries like India, China and United States have an average access of 43%, 29% and 39% respectively, highlighting potential areas for enhancing public transport connectivity. </a:t>
+              <a:t>Countries like India, China and United States have an average access of 43%, 29% and 39% respectively, highlighting potential areas for enhancing public transport connectivity</a:t>
             </a:r>
           </a:p>
           <a:p>
@@ -8719,7 +8719,7 @@
                 <a:latin typeface="Arial" panose="020B0604020202020204" pitchFamily="34" charset="0"/>
                 <a:cs typeface="Arial" panose="020B0604020202020204" pitchFamily="34" charset="0"/>
               </a:rPr>
-              <a:t>This analysis highlights a clear global divide in urban public transport access, emphasizing the critical need for enhanced infrastructure in regions with low accessibility. Europe's public transport network sets a benchmark, showcasing the transformative impact of comprehensive planning and investment.</a:t>
+              <a:t>This analysis highlights a clear global divide in urban public transport access, emphasizing the critical need for enhanced infrastructure in regions with low accessibility. Europe's public transport network sets a benchmark, showcasing the transformative impact of comprehensive planning and investment</a:t>
             </a:r>
             <a:endParaRPr lang="en-US" dirty="0">
               <a:solidFill>

</xml_diff>